<commit_message>
Fix for Narrative Overlapping
</commit_message>
<xml_diff>
--- a/org.mwc.cmap.combined.feature/root_installs/sample_data/other_formats/master_template_01.pptx
+++ b/org.mwc.cmap.combined.feature/root_installs/sample_data/other_formats/master_template_01.pptx
@@ -4451,7 +4451,7 @@
                 <a:ea typeface="Consolas" charset="0"/>
                 <a:cs typeface="Consolas" charset="0"/>
               </a:rPr>
-              <a:t>RX CONGRATS</a:t>
+              <a:t/>
             </a:r>
             <a:br>
               <a:rPr lang="en-US" b="1" dirty="0">
@@ -4472,7 +4472,7 @@
                 <a:ea typeface="Consolas" charset="0"/>
                 <a:cs typeface="Consolas" charset="0"/>
               </a:rPr>
-              <a:t>ON UWT</a:t>
+              <a:t/>
             </a:r>
           </a:p>
         </p:txBody>

</xml_diff>

<commit_message>
Moving Scale Bar and Scale Value to the left.
</commit_message>
<xml_diff>
--- a/org.mwc.cmap.combined.feature/root_installs/sample_data/other_formats/master_template_01.pptx
+++ b/org.mwc.cmap.combined.feature/root_installs/sample_data/other_formats/master_template_01.pptx
@@ -4129,7 +4129,7 @@
         </p:nvSpPr>
         <p:spPr>
           <a:xfrm flipV="1">
-            <a:off x="9456616" y="615601"/>
+            <a:off x="3572010" y="615601"/>
             <a:ext cx="2231413" cy="45719"/>
           </a:xfrm>
           <a:prstGeom prst="rect">
@@ -4189,7 +4189,7 @@
         </p:nvSpPr>
         <p:spPr>
           <a:xfrm>
-            <a:off x="10351882" y="690508"/>
+            <a:off x="3572010" y="719124"/>
             <a:ext cx="415498" cy="246221"/>
           </a:xfrm>
           <a:prstGeom prst="rect">

</xml_diff>